<commit_message>
0.61/0.69 fix JSON format
</commit_message>
<xml_diff>
--- a/app/static/images0/ytbg.pptx
+++ b/app/static/images0/ytbg.pptx
@@ -260,7 +260,7 @@
           <a:p>
             <a:fld id="{117D3312-2144-4C7E-858D-02C968285917}" type="datetimeFigureOut">
               <a:rPr kumimoji="1" lang="ja-JP" altLang="en-US" smtClean="0"/>
-              <a:t>2020/5/17</a:t>
+              <a:t>2020/5/18</a:t>
             </a:fld>
             <a:endParaRPr kumimoji="1" lang="ja-JP" altLang="en-US"/>
           </a:p>
@@ -490,7 +490,7 @@
           <a:p>
             <a:fld id="{117D3312-2144-4C7E-858D-02C968285917}" type="datetimeFigureOut">
               <a:rPr kumimoji="1" lang="ja-JP" altLang="en-US" smtClean="0"/>
-              <a:t>2020/5/17</a:t>
+              <a:t>2020/5/18</a:t>
             </a:fld>
             <a:endParaRPr kumimoji="1" lang="ja-JP" altLang="en-US"/>
           </a:p>
@@ -730,7 +730,7 @@
           <a:p>
             <a:fld id="{117D3312-2144-4C7E-858D-02C968285917}" type="datetimeFigureOut">
               <a:rPr kumimoji="1" lang="ja-JP" altLang="en-US" smtClean="0"/>
-              <a:t>2020/5/17</a:t>
+              <a:t>2020/5/18</a:t>
             </a:fld>
             <a:endParaRPr kumimoji="1" lang="ja-JP" altLang="en-US"/>
           </a:p>
@@ -960,7 +960,7 @@
           <a:p>
             <a:fld id="{117D3312-2144-4C7E-858D-02C968285917}" type="datetimeFigureOut">
               <a:rPr kumimoji="1" lang="ja-JP" altLang="en-US" smtClean="0"/>
-              <a:t>2020/5/17</a:t>
+              <a:t>2020/5/18</a:t>
             </a:fld>
             <a:endParaRPr kumimoji="1" lang="ja-JP" altLang="en-US"/>
           </a:p>
@@ -1235,7 +1235,7 @@
           <a:p>
             <a:fld id="{117D3312-2144-4C7E-858D-02C968285917}" type="datetimeFigureOut">
               <a:rPr kumimoji="1" lang="ja-JP" altLang="en-US" smtClean="0"/>
-              <a:t>2020/5/17</a:t>
+              <a:t>2020/5/18</a:t>
             </a:fld>
             <a:endParaRPr kumimoji="1" lang="ja-JP" altLang="en-US"/>
           </a:p>
@@ -1564,7 +1564,7 @@
           <a:p>
             <a:fld id="{117D3312-2144-4C7E-858D-02C968285917}" type="datetimeFigureOut">
               <a:rPr kumimoji="1" lang="ja-JP" altLang="en-US" smtClean="0"/>
-              <a:t>2020/5/17</a:t>
+              <a:t>2020/5/18</a:t>
             </a:fld>
             <a:endParaRPr kumimoji="1" lang="ja-JP" altLang="en-US"/>
           </a:p>
@@ -2040,7 +2040,7 @@
           <a:p>
             <a:fld id="{117D3312-2144-4C7E-858D-02C968285917}" type="datetimeFigureOut">
               <a:rPr kumimoji="1" lang="ja-JP" altLang="en-US" smtClean="0"/>
-              <a:t>2020/5/17</a:t>
+              <a:t>2020/5/18</a:t>
             </a:fld>
             <a:endParaRPr kumimoji="1" lang="ja-JP" altLang="en-US"/>
           </a:p>
@@ -2181,7 +2181,7 @@
           <a:p>
             <a:fld id="{117D3312-2144-4C7E-858D-02C968285917}" type="datetimeFigureOut">
               <a:rPr kumimoji="1" lang="ja-JP" altLang="en-US" smtClean="0"/>
-              <a:t>2020/5/17</a:t>
+              <a:t>2020/5/18</a:t>
             </a:fld>
             <a:endParaRPr kumimoji="1" lang="ja-JP" altLang="en-US"/>
           </a:p>
@@ -2294,7 +2294,7 @@
           <a:p>
             <a:fld id="{117D3312-2144-4C7E-858D-02C968285917}" type="datetimeFigureOut">
               <a:rPr kumimoji="1" lang="ja-JP" altLang="en-US" smtClean="0"/>
-              <a:t>2020/5/17</a:t>
+              <a:t>2020/5/18</a:t>
             </a:fld>
             <a:endParaRPr kumimoji="1" lang="ja-JP" altLang="en-US"/>
           </a:p>
@@ -2637,7 +2637,7 @@
           <a:p>
             <a:fld id="{117D3312-2144-4C7E-858D-02C968285917}" type="datetimeFigureOut">
               <a:rPr kumimoji="1" lang="ja-JP" altLang="en-US" smtClean="0"/>
-              <a:t>2020/5/17</a:t>
+              <a:t>2020/5/18</a:t>
             </a:fld>
             <a:endParaRPr kumimoji="1" lang="ja-JP" altLang="en-US"/>
           </a:p>
@@ -2925,7 +2925,7 @@
           <a:p>
             <a:fld id="{117D3312-2144-4C7E-858D-02C968285917}" type="datetimeFigureOut">
               <a:rPr kumimoji="1" lang="ja-JP" altLang="en-US" smtClean="0"/>
-              <a:t>2020/5/17</a:t>
+              <a:t>2020/5/18</a:t>
             </a:fld>
             <a:endParaRPr kumimoji="1" lang="ja-JP" altLang="en-US"/>
           </a:p>
@@ -3198,7 +3198,7 @@
           <a:p>
             <a:fld id="{117D3312-2144-4C7E-858D-02C968285917}" type="datetimeFigureOut">
               <a:rPr kumimoji="1" lang="ja-JP" altLang="en-US" smtClean="0"/>
-              <a:t>2020/5/17</a:t>
+              <a:t>2020/5/18</a:t>
             </a:fld>
             <a:endParaRPr kumimoji="1" lang="ja-JP" altLang="en-US"/>
           </a:p>
@@ -3629,7 +3629,7 @@
         </p:nvSpPr>
         <p:spPr>
           <a:xfrm>
-            <a:off x="6095999" y="4162017"/>
+            <a:off x="5564353" y="4669313"/>
             <a:ext cx="1134460" cy="1134460"/>
           </a:xfrm>
           <a:prstGeom prst="roundRect">
@@ -4124,7 +4124,7 @@
         </p:nvSpPr>
         <p:spPr>
           <a:xfrm rot="16200000" flipV="1">
-            <a:off x="6271343" y="4348979"/>
+            <a:off x="5739697" y="4856275"/>
             <a:ext cx="802821" cy="745841"/>
           </a:xfrm>
           <a:prstGeom prst="uturnArrow">
@@ -4198,7 +4198,7 @@
         </p:nvSpPr>
         <p:spPr>
           <a:xfrm>
-            <a:off x="6095999" y="2765029"/>
+            <a:off x="5564353" y="3272325"/>
             <a:ext cx="1134460" cy="1134460"/>
           </a:xfrm>
           <a:prstGeom prst="roundRect">
@@ -4259,7 +4259,7 @@
         </p:nvSpPr>
         <p:spPr>
           <a:xfrm>
-            <a:off x="6324870" y="3012938"/>
+            <a:off x="5793224" y="3520234"/>
             <a:ext cx="745841" cy="605991"/>
           </a:xfrm>
           <a:prstGeom prst="bentArrow">
@@ -4331,7 +4331,7 @@
         </p:nvSpPr>
         <p:spPr>
           <a:xfrm>
-            <a:off x="6105523" y="1196731"/>
+            <a:off x="5573877" y="1704027"/>
             <a:ext cx="1134460" cy="1134460"/>
           </a:xfrm>
           <a:prstGeom prst="roundRect">
@@ -4392,7 +4392,7 @@
         </p:nvSpPr>
         <p:spPr>
           <a:xfrm rot="3916225">
-            <a:off x="6154066" y="1273515"/>
+            <a:off x="5622420" y="1780811"/>
             <a:ext cx="989128" cy="980893"/>
           </a:xfrm>
           <a:prstGeom prst="circularArrow">
@@ -4449,6 +4449,202 @@
           </a:p>
         </p:txBody>
       </p:sp>
+      <p:sp>
+        <p:nvSpPr>
+          <p:cNvPr id="15" name="四角形: 角を丸くする 14">
+            <a:extLst>
+              <a:ext uri="{FF2B5EF4-FFF2-40B4-BE49-F238E27FC236}">
+                <a16:creationId xmlns:a16="http://schemas.microsoft.com/office/drawing/2014/main" id="{9BBB9691-8BA9-40B6-9A1B-28D1265C97F2}"/>
+              </a:ext>
+            </a:extLst>
+          </p:cNvPr>
+          <p:cNvSpPr/>
+          <p:nvPr/>
+        </p:nvSpPr>
+        <p:spPr>
+          <a:xfrm>
+            <a:off x="5528770" y="309074"/>
+            <a:ext cx="1134460" cy="1134460"/>
+          </a:xfrm>
+          <a:prstGeom prst="roundRect">
+            <a:avLst/>
+          </a:prstGeom>
+          <a:solidFill>
+            <a:schemeClr val="bg1">
+              <a:lumMod val="65000"/>
+            </a:schemeClr>
+          </a:solidFill>
+          <a:ln>
+            <a:noFill/>
+          </a:ln>
+          <a:scene3d>
+            <a:camera prst="orthographicFront"/>
+            <a:lightRig rig="threePt" dir="t"/>
+          </a:scene3d>
+          <a:sp3d>
+            <a:bevelT w="127000" h="63500"/>
+          </a:sp3d>
+        </p:spPr>
+        <p:style>
+          <a:lnRef idx="2">
+            <a:schemeClr val="accent1">
+              <a:shade val="50000"/>
+            </a:schemeClr>
+          </a:lnRef>
+          <a:fillRef idx="1">
+            <a:schemeClr val="accent1"/>
+          </a:fillRef>
+          <a:effectRef idx="0">
+            <a:schemeClr val="accent1"/>
+          </a:effectRef>
+          <a:fontRef idx="minor">
+            <a:schemeClr val="lt1"/>
+          </a:fontRef>
+        </p:style>
+        <p:txBody>
+          <a:bodyPr rtlCol="0" anchor="ctr"/>
+          <a:lstStyle/>
+          <a:p>
+            <a:pPr algn="ctr"/>
+            <a:endParaRPr kumimoji="1" lang="ja-JP" altLang="en-US"/>
+          </a:p>
+        </p:txBody>
+      </p:sp>
+      <p:grpSp>
+        <p:nvGrpSpPr>
+          <p:cNvPr id="21" name="グループ化 20">
+            <a:extLst>
+              <a:ext uri="{FF2B5EF4-FFF2-40B4-BE49-F238E27FC236}">
+                <a16:creationId xmlns:a16="http://schemas.microsoft.com/office/drawing/2014/main" id="{277AC44C-BFDF-4FD5-845C-57F5755B460E}"/>
+              </a:ext>
+            </a:extLst>
+          </p:cNvPr>
+          <p:cNvGrpSpPr/>
+          <p:nvPr/>
+        </p:nvGrpSpPr>
+        <p:grpSpPr>
+          <a:xfrm rot="900000">
+            <a:off x="5744060" y="555165"/>
+            <a:ext cx="658161" cy="642277"/>
+            <a:chOff x="7075243" y="576261"/>
+            <a:chExt cx="658161" cy="642277"/>
+          </a:xfrm>
+        </p:grpSpPr>
+        <p:sp>
+          <p:nvSpPr>
+            <p:cNvPr id="5" name="小波 4">
+              <a:extLst>
+                <a:ext uri="{FF2B5EF4-FFF2-40B4-BE49-F238E27FC236}">
+                  <a16:creationId xmlns:a16="http://schemas.microsoft.com/office/drawing/2014/main" id="{9E40BD14-EB8C-4C69-9AB6-915CC7CC05E3}"/>
+                </a:ext>
+              </a:extLst>
+            </p:cNvPr>
+            <p:cNvSpPr/>
+            <p:nvPr/>
+          </p:nvSpPr>
+          <p:spPr>
+            <a:xfrm>
+              <a:off x="7222209" y="576261"/>
+              <a:ext cx="511195" cy="403974"/>
+            </a:xfrm>
+            <a:prstGeom prst="doubleWave">
+              <a:avLst/>
+            </a:prstGeom>
+            <a:solidFill>
+              <a:schemeClr val="bg1">
+                <a:lumMod val="85000"/>
+              </a:schemeClr>
+            </a:solidFill>
+            <a:ln>
+              <a:noFill/>
+            </a:ln>
+            <a:scene3d>
+              <a:camera prst="orthographicFront"/>
+              <a:lightRig rig="threePt" dir="t"/>
+            </a:scene3d>
+            <a:sp3d prstMaterial="metal">
+              <a:bevelT w="25400" h="12700"/>
+            </a:sp3d>
+          </p:spPr>
+          <p:style>
+            <a:lnRef idx="2">
+              <a:schemeClr val="accent1">
+                <a:shade val="50000"/>
+              </a:schemeClr>
+            </a:lnRef>
+            <a:fillRef idx="1">
+              <a:schemeClr val="accent1"/>
+            </a:fillRef>
+            <a:effectRef idx="0">
+              <a:schemeClr val="accent1"/>
+            </a:effectRef>
+            <a:fontRef idx="minor">
+              <a:schemeClr val="lt1"/>
+            </a:fontRef>
+          </p:style>
+          <p:txBody>
+            <a:bodyPr rtlCol="0" anchor="ctr"/>
+            <a:lstStyle/>
+            <a:p>
+              <a:pPr algn="ctr"/>
+              <a:endParaRPr kumimoji="1" lang="ja-JP" altLang="en-US" dirty="0"/>
+            </a:p>
+          </p:txBody>
+        </p:sp>
+        <p:cxnSp>
+          <p:nvCxnSpPr>
+            <p:cNvPr id="9" name="直線コネクタ 8">
+              <a:extLst>
+                <a:ext uri="{FF2B5EF4-FFF2-40B4-BE49-F238E27FC236}">
+                  <a16:creationId xmlns:a16="http://schemas.microsoft.com/office/drawing/2014/main" id="{7CD99200-5191-4E99-84DE-C5A01E6DEDD4}"/>
+                </a:ext>
+              </a:extLst>
+            </p:cNvPr>
+            <p:cNvCxnSpPr>
+              <a:cxnSpLocks/>
+            </p:cNvCxnSpPr>
+            <p:nvPr/>
+          </p:nvCxnSpPr>
+          <p:spPr>
+            <a:xfrm rot="19800000" flipH="1">
+              <a:off x="7075243" y="613089"/>
+              <a:ext cx="328589" cy="605449"/>
+            </a:xfrm>
+            <a:prstGeom prst="line">
+              <a:avLst/>
+            </a:prstGeom>
+            <a:ln w="53975">
+              <a:solidFill>
+                <a:schemeClr val="bg1">
+                  <a:lumMod val="85000"/>
+                </a:schemeClr>
+              </a:solidFill>
+              <a:headEnd type="none"/>
+            </a:ln>
+            <a:scene3d>
+              <a:camera prst="orthographicFront"/>
+              <a:lightRig rig="threePt" dir="t"/>
+            </a:scene3d>
+            <a:sp3d prstMaterial="metal">
+              <a:bevelT w="25400" h="12700"/>
+            </a:sp3d>
+          </p:spPr>
+          <p:style>
+            <a:lnRef idx="1">
+              <a:schemeClr val="accent1"/>
+            </a:lnRef>
+            <a:fillRef idx="0">
+              <a:schemeClr val="accent1"/>
+            </a:fillRef>
+            <a:effectRef idx="0">
+              <a:schemeClr val="accent1"/>
+            </a:effectRef>
+            <a:fontRef idx="minor">
+              <a:schemeClr val="tx1"/>
+            </a:fontRef>
+          </p:style>
+        </p:cxnSp>
+      </p:grpSp>
     </p:spTree>
     <p:extLst>
       <p:ext uri="{BB962C8B-B14F-4D97-AF65-F5344CB8AC3E}">

</xml_diff>

<commit_message>
0.66/0.83 modify class tree
</commit_message>
<xml_diff>
--- a/app/static/images0/ytbg.pptx
+++ b/app/static/images0/ytbg.pptx
@@ -261,7 +261,7 @@
           <a:p>
             <a:fld id="{117D3312-2144-4C7E-858D-02C968285917}" type="datetimeFigureOut">
               <a:rPr kumimoji="1" lang="ja-JP" altLang="en-US" smtClean="0"/>
-              <a:t>2020/5/22</a:t>
+              <a:t>2020/5/25</a:t>
             </a:fld>
             <a:endParaRPr kumimoji="1" lang="ja-JP" altLang="en-US"/>
           </a:p>
@@ -491,7 +491,7 @@
           <a:p>
             <a:fld id="{117D3312-2144-4C7E-858D-02C968285917}" type="datetimeFigureOut">
               <a:rPr kumimoji="1" lang="ja-JP" altLang="en-US" smtClean="0"/>
-              <a:t>2020/5/22</a:t>
+              <a:t>2020/5/25</a:t>
             </a:fld>
             <a:endParaRPr kumimoji="1" lang="ja-JP" altLang="en-US"/>
           </a:p>
@@ -731,7 +731,7 @@
           <a:p>
             <a:fld id="{117D3312-2144-4C7E-858D-02C968285917}" type="datetimeFigureOut">
               <a:rPr kumimoji="1" lang="ja-JP" altLang="en-US" smtClean="0"/>
-              <a:t>2020/5/22</a:t>
+              <a:t>2020/5/25</a:t>
             </a:fld>
             <a:endParaRPr kumimoji="1" lang="ja-JP" altLang="en-US"/>
           </a:p>
@@ -961,7 +961,7 @@
           <a:p>
             <a:fld id="{117D3312-2144-4C7E-858D-02C968285917}" type="datetimeFigureOut">
               <a:rPr kumimoji="1" lang="ja-JP" altLang="en-US" smtClean="0"/>
-              <a:t>2020/5/22</a:t>
+              <a:t>2020/5/25</a:t>
             </a:fld>
             <a:endParaRPr kumimoji="1" lang="ja-JP" altLang="en-US"/>
           </a:p>
@@ -1236,7 +1236,7 @@
           <a:p>
             <a:fld id="{117D3312-2144-4C7E-858D-02C968285917}" type="datetimeFigureOut">
               <a:rPr kumimoji="1" lang="ja-JP" altLang="en-US" smtClean="0"/>
-              <a:t>2020/5/22</a:t>
+              <a:t>2020/5/25</a:t>
             </a:fld>
             <a:endParaRPr kumimoji="1" lang="ja-JP" altLang="en-US"/>
           </a:p>
@@ -1565,7 +1565,7 @@
           <a:p>
             <a:fld id="{117D3312-2144-4C7E-858D-02C968285917}" type="datetimeFigureOut">
               <a:rPr kumimoji="1" lang="ja-JP" altLang="en-US" smtClean="0"/>
-              <a:t>2020/5/22</a:t>
+              <a:t>2020/5/25</a:t>
             </a:fld>
             <a:endParaRPr kumimoji="1" lang="ja-JP" altLang="en-US"/>
           </a:p>
@@ -2041,7 +2041,7 @@
           <a:p>
             <a:fld id="{117D3312-2144-4C7E-858D-02C968285917}" type="datetimeFigureOut">
               <a:rPr kumimoji="1" lang="ja-JP" altLang="en-US" smtClean="0"/>
-              <a:t>2020/5/22</a:t>
+              <a:t>2020/5/25</a:t>
             </a:fld>
             <a:endParaRPr kumimoji="1" lang="ja-JP" altLang="en-US"/>
           </a:p>
@@ -2182,7 +2182,7 @@
           <a:p>
             <a:fld id="{117D3312-2144-4C7E-858D-02C968285917}" type="datetimeFigureOut">
               <a:rPr kumimoji="1" lang="ja-JP" altLang="en-US" smtClean="0"/>
-              <a:t>2020/5/22</a:t>
+              <a:t>2020/5/25</a:t>
             </a:fld>
             <a:endParaRPr kumimoji="1" lang="ja-JP" altLang="en-US"/>
           </a:p>
@@ -2295,7 +2295,7 @@
           <a:p>
             <a:fld id="{117D3312-2144-4C7E-858D-02C968285917}" type="datetimeFigureOut">
               <a:rPr kumimoji="1" lang="ja-JP" altLang="en-US" smtClean="0"/>
-              <a:t>2020/5/22</a:t>
+              <a:t>2020/5/25</a:t>
             </a:fld>
             <a:endParaRPr kumimoji="1" lang="ja-JP" altLang="en-US"/>
           </a:p>
@@ -2638,7 +2638,7 @@
           <a:p>
             <a:fld id="{117D3312-2144-4C7E-858D-02C968285917}" type="datetimeFigureOut">
               <a:rPr kumimoji="1" lang="ja-JP" altLang="en-US" smtClean="0"/>
-              <a:t>2020/5/22</a:t>
+              <a:t>2020/5/25</a:t>
             </a:fld>
             <a:endParaRPr kumimoji="1" lang="ja-JP" altLang="en-US"/>
           </a:p>
@@ -2926,7 +2926,7 @@
           <a:p>
             <a:fld id="{117D3312-2144-4C7E-858D-02C968285917}" type="datetimeFigureOut">
               <a:rPr kumimoji="1" lang="ja-JP" altLang="en-US" smtClean="0"/>
-              <a:t>2020/5/22</a:t>
+              <a:t>2020/5/25</a:t>
             </a:fld>
             <a:endParaRPr kumimoji="1" lang="ja-JP" altLang="en-US"/>
           </a:p>
@@ -3199,7 +3199,7 @@
           <a:p>
             <a:fld id="{117D3312-2144-4C7E-858D-02C968285917}" type="datetimeFigureOut">
               <a:rPr kumimoji="1" lang="ja-JP" altLang="en-US" smtClean="0"/>
-              <a:t>2020/5/22</a:t>
+              <a:t>2020/5/25</a:t>
             </a:fld>
             <a:endParaRPr kumimoji="1" lang="ja-JP" altLang="en-US"/>
           </a:p>
@@ -5107,7 +5107,7 @@
         </p:blipFill>
         <p:spPr>
           <a:xfrm>
-            <a:off x="3009530" y="859240"/>
+            <a:off x="2026304" y="869072"/>
             <a:ext cx="8939813" cy="5275229"/>
           </a:xfrm>
           <a:prstGeom prst="rect">
@@ -5117,10 +5117,10 @@
       </p:pic>
       <p:sp>
         <p:nvSpPr>
-          <p:cNvPr id="10" name="吹き出し: 角を丸めた四角形 9">
-            <a:extLst>
-              <a:ext uri="{FF2B5EF4-FFF2-40B4-BE49-F238E27FC236}">
-                <a16:creationId xmlns:a16="http://schemas.microsoft.com/office/drawing/2014/main" id="{8BE8792D-4901-4371-A488-6F97944219A1}"/>
+          <p:cNvPr id="11" name="吹き出し: 角を丸めた四角形 10">
+            <a:extLst>
+              <a:ext uri="{FF2B5EF4-FFF2-40B4-BE49-F238E27FC236}">
+                <a16:creationId xmlns:a16="http://schemas.microsoft.com/office/drawing/2014/main" id="{9689F86D-4305-48C1-A95D-832CE998F58F}"/>
               </a:ext>
             </a:extLst>
           </p:cNvPr>
@@ -5129,13 +5129,13 @@
         </p:nvSpPr>
         <p:spPr>
           <a:xfrm>
-            <a:off x="1336089" y="3284739"/>
-            <a:ext cx="1868750" cy="754601"/>
+            <a:off x="3127039" y="1446104"/>
+            <a:ext cx="1868751" cy="754601"/>
           </a:xfrm>
           <a:prstGeom prst="wedgeRoundRectCallout">
             <a:avLst>
-              <a:gd name="adj1" fmla="val 61020"/>
-              <a:gd name="adj2" fmla="val 126245"/>
+              <a:gd name="adj1" fmla="val -86440"/>
+              <a:gd name="adj2" fmla="val 361267"/>
               <a:gd name="adj3" fmla="val 16667"/>
             </a:avLst>
           </a:prstGeom>
@@ -5161,16 +5161,34 @@
           <a:lstStyle/>
           <a:p>
             <a:pPr algn="ctr"/>
-            <a:endParaRPr kumimoji="1" lang="ja-JP" altLang="en-US" dirty="0"/>
-          </a:p>
-        </p:txBody>
-      </p:sp>
-      <p:sp>
-        <p:nvSpPr>
-          <p:cNvPr id="6" name="吹き出し: 角を丸めた四角形 5">
-            <a:extLst>
-              <a:ext uri="{FF2B5EF4-FFF2-40B4-BE49-F238E27FC236}">
-                <a16:creationId xmlns:a16="http://schemas.microsoft.com/office/drawing/2014/main" id="{1EBEE0C7-5703-424E-AF1F-CCA2E20F2A3E}"/>
+            <a:r>
+              <a:rPr kumimoji="1" lang="en-US" altLang="ja-JP" dirty="0"/>
+              <a:t>(</a:t>
+            </a:r>
+            <a:r>
+              <a:rPr kumimoji="1" lang="ja-JP" altLang="en-US" dirty="0"/>
+              <a:t>数字の上半分</a:t>
+            </a:r>
+            <a:r>
+              <a:rPr kumimoji="1" lang="en-US" altLang="ja-JP" dirty="0"/>
+              <a:t>)</a:t>
+            </a:r>
+          </a:p>
+          <a:p>
+            <a:pPr algn="ctr"/>
+            <a:r>
+              <a:rPr kumimoji="1" lang="ja-JP" altLang="en-US" b="1" dirty="0"/>
+              <a:t>カウントアップ</a:t>
+            </a:r>
+          </a:p>
+        </p:txBody>
+      </p:sp>
+      <p:sp>
+        <p:nvSpPr>
+          <p:cNvPr id="13" name="吹き出し: 角を丸めた四角形 12">
+            <a:extLst>
+              <a:ext uri="{FF2B5EF4-FFF2-40B4-BE49-F238E27FC236}">
+                <a16:creationId xmlns:a16="http://schemas.microsoft.com/office/drawing/2014/main" id="{19E2824E-5589-4D85-9823-B47125F71EB8}"/>
               </a:ext>
             </a:extLst>
           </p:cNvPr>
@@ -5179,13 +5197,13 @@
         </p:nvSpPr>
         <p:spPr>
           <a:xfrm>
-            <a:off x="3897296" y="1401724"/>
-            <a:ext cx="1162975" cy="648070"/>
+            <a:off x="3127038" y="5162697"/>
+            <a:ext cx="1868751" cy="754601"/>
           </a:xfrm>
           <a:prstGeom prst="wedgeRoundRectCallout">
             <a:avLst>
-              <a:gd name="adj1" fmla="val -76373"/>
-              <a:gd name="adj2" fmla="val 133733"/>
+              <a:gd name="adj1" fmla="val -72157"/>
+              <a:gd name="adj2" fmla="val -121796"/>
               <a:gd name="adj3" fmla="val 16667"/>
             </a:avLst>
           </a:prstGeom>
@@ -5213,264 +5231,6 @@
             <a:pPr algn="ctr"/>
             <a:r>
               <a:rPr kumimoji="1" lang="en-US" altLang="ja-JP" dirty="0"/>
-              <a:t>Player 2</a:t>
-            </a:r>
-          </a:p>
-          <a:p>
-            <a:pPr algn="ctr"/>
-            <a:r>
-              <a:rPr kumimoji="1" lang="ja-JP" altLang="en-US" dirty="0"/>
-              <a:t>の得点</a:t>
-            </a:r>
-          </a:p>
-        </p:txBody>
-      </p:sp>
-      <p:sp>
-        <p:nvSpPr>
-          <p:cNvPr id="9" name="吹き出し: 角を丸めた四角形 8">
-            <a:extLst>
-              <a:ext uri="{FF2B5EF4-FFF2-40B4-BE49-F238E27FC236}">
-                <a16:creationId xmlns:a16="http://schemas.microsoft.com/office/drawing/2014/main" id="{D665705D-82A9-443B-8EAE-82D62A545AE4}"/>
-              </a:ext>
-            </a:extLst>
-          </p:cNvPr>
-          <p:cNvSpPr/>
-          <p:nvPr/>
-        </p:nvSpPr>
-        <p:spPr>
-          <a:xfrm>
-            <a:off x="3897297" y="5132241"/>
-            <a:ext cx="1162975" cy="648070"/>
-          </a:xfrm>
-          <a:prstGeom prst="wedgeRoundRectCallout">
-            <a:avLst>
-              <a:gd name="adj1" fmla="val -79426"/>
-              <a:gd name="adj2" fmla="val -95033"/>
-              <a:gd name="adj3" fmla="val 16667"/>
-            </a:avLst>
-          </a:prstGeom>
-        </p:spPr>
-        <p:style>
-          <a:lnRef idx="2">
-            <a:schemeClr val="accent1">
-              <a:shade val="50000"/>
-            </a:schemeClr>
-          </a:lnRef>
-          <a:fillRef idx="1">
-            <a:schemeClr val="accent1"/>
-          </a:fillRef>
-          <a:effectRef idx="0">
-            <a:schemeClr val="accent1"/>
-          </a:effectRef>
-          <a:fontRef idx="minor">
-            <a:schemeClr val="lt1"/>
-          </a:fontRef>
-        </p:style>
-        <p:txBody>
-          <a:bodyPr rtlCol="0" anchor="ctr"/>
-          <a:lstStyle/>
-          <a:p>
-            <a:pPr algn="ctr"/>
-            <a:r>
-              <a:rPr kumimoji="1" lang="en-US" altLang="ja-JP" dirty="0"/>
-              <a:t>Player 1</a:t>
-            </a:r>
-          </a:p>
-          <a:p>
-            <a:pPr algn="ctr"/>
-            <a:r>
-              <a:rPr kumimoji="1" lang="ja-JP" altLang="en-US" dirty="0"/>
-              <a:t>の得点</a:t>
-            </a:r>
-          </a:p>
-        </p:txBody>
-      </p:sp>
-      <p:sp>
-        <p:nvSpPr>
-          <p:cNvPr id="11" name="吹き出し: 角を丸めた四角形 10">
-            <a:extLst>
-              <a:ext uri="{FF2B5EF4-FFF2-40B4-BE49-F238E27FC236}">
-                <a16:creationId xmlns:a16="http://schemas.microsoft.com/office/drawing/2014/main" id="{9689F86D-4305-48C1-A95D-832CE998F58F}"/>
-              </a:ext>
-            </a:extLst>
-          </p:cNvPr>
-          <p:cNvSpPr/>
-          <p:nvPr/>
-        </p:nvSpPr>
-        <p:spPr>
-          <a:xfrm>
-            <a:off x="1336089" y="3284739"/>
-            <a:ext cx="1868751" cy="754601"/>
-          </a:xfrm>
-          <a:prstGeom prst="wedgeRoundRectCallout">
-            <a:avLst>
-              <a:gd name="adj1" fmla="val 59827"/>
-              <a:gd name="adj2" fmla="val -107804"/>
-              <a:gd name="adj3" fmla="val 16667"/>
-            </a:avLst>
-          </a:prstGeom>
-        </p:spPr>
-        <p:style>
-          <a:lnRef idx="2">
-            <a:schemeClr val="accent1">
-              <a:shade val="50000"/>
-            </a:schemeClr>
-          </a:lnRef>
-          <a:fillRef idx="1">
-            <a:schemeClr val="accent1"/>
-          </a:fillRef>
-          <a:effectRef idx="0">
-            <a:schemeClr val="accent1"/>
-          </a:effectRef>
-          <a:fontRef idx="minor">
-            <a:schemeClr val="lt1"/>
-          </a:fontRef>
-        </p:style>
-        <p:txBody>
-          <a:bodyPr rtlCol="0" anchor="ctr"/>
-          <a:lstStyle/>
-          <a:p>
-            <a:pPr algn="ctr"/>
-            <a:r>
-              <a:rPr kumimoji="1" lang="en-US" altLang="ja-JP" dirty="0"/>
-              <a:t>(</a:t>
-            </a:r>
-            <a:r>
-              <a:rPr kumimoji="1" lang="ja-JP" altLang="en-US" dirty="0"/>
-              <a:t>数字の上半分</a:t>
-            </a:r>
-            <a:r>
-              <a:rPr kumimoji="1" lang="en-US" altLang="ja-JP" dirty="0"/>
-              <a:t>)</a:t>
-            </a:r>
-          </a:p>
-          <a:p>
-            <a:pPr algn="ctr"/>
-            <a:r>
-              <a:rPr kumimoji="1" lang="ja-JP" altLang="en-US" b="1" dirty="0"/>
-              <a:t>カウントアップ</a:t>
-            </a:r>
-          </a:p>
-        </p:txBody>
-      </p:sp>
-      <p:sp>
-        <p:nvSpPr>
-          <p:cNvPr id="12" name="吹き出し: 角を丸めた四角形 11">
-            <a:extLst>
-              <a:ext uri="{FF2B5EF4-FFF2-40B4-BE49-F238E27FC236}">
-                <a16:creationId xmlns:a16="http://schemas.microsoft.com/office/drawing/2014/main" id="{8E3523F9-E922-4A4A-9A6B-2648950138C2}"/>
-              </a:ext>
-            </a:extLst>
-          </p:cNvPr>
-          <p:cNvSpPr/>
-          <p:nvPr/>
-        </p:nvSpPr>
-        <p:spPr>
-          <a:xfrm>
-            <a:off x="3943904" y="3284738"/>
-            <a:ext cx="1868751" cy="754601"/>
-          </a:xfrm>
-          <a:prstGeom prst="wedgeRoundRectCallout">
-            <a:avLst>
-              <a:gd name="adj1" fmla="val -62263"/>
-              <a:gd name="adj2" fmla="val -103098"/>
-              <a:gd name="adj3" fmla="val 16667"/>
-            </a:avLst>
-          </a:prstGeom>
-        </p:spPr>
-        <p:style>
-          <a:lnRef idx="2">
-            <a:schemeClr val="accent1">
-              <a:shade val="50000"/>
-            </a:schemeClr>
-          </a:lnRef>
-          <a:fillRef idx="1">
-            <a:schemeClr val="accent1"/>
-          </a:fillRef>
-          <a:effectRef idx="0">
-            <a:schemeClr val="accent1"/>
-          </a:effectRef>
-          <a:fontRef idx="minor">
-            <a:schemeClr val="lt1"/>
-          </a:fontRef>
-        </p:style>
-        <p:txBody>
-          <a:bodyPr rtlCol="0" anchor="ctr"/>
-          <a:lstStyle/>
-          <a:p>
-            <a:pPr algn="ctr"/>
-            <a:r>
-              <a:rPr kumimoji="1" lang="en-US" altLang="ja-JP" dirty="0"/>
-              <a:t>(</a:t>
-            </a:r>
-            <a:r>
-              <a:rPr kumimoji="1" lang="ja-JP" altLang="en-US" dirty="0"/>
-              <a:t>数字の下半分</a:t>
-            </a:r>
-            <a:r>
-              <a:rPr kumimoji="1" lang="en-US" altLang="ja-JP" dirty="0"/>
-              <a:t>)</a:t>
-            </a:r>
-            <a:endParaRPr lang="en-US" altLang="ja-JP" dirty="0"/>
-          </a:p>
-          <a:p>
-            <a:pPr algn="ctr"/>
-            <a:r>
-              <a:rPr kumimoji="1" lang="ja-JP" altLang="en-US" dirty="0"/>
-              <a:t>ゼロ・クリア</a:t>
-            </a:r>
-            <a:endParaRPr kumimoji="1" lang="en-US" altLang="ja-JP" dirty="0"/>
-          </a:p>
-        </p:txBody>
-      </p:sp>
-      <p:sp>
-        <p:nvSpPr>
-          <p:cNvPr id="13" name="吹き出し: 角を丸めた四角形 12">
-            <a:extLst>
-              <a:ext uri="{FF2B5EF4-FFF2-40B4-BE49-F238E27FC236}">
-                <a16:creationId xmlns:a16="http://schemas.microsoft.com/office/drawing/2014/main" id="{19E2824E-5589-4D85-9823-B47125F71EB8}"/>
-              </a:ext>
-            </a:extLst>
-          </p:cNvPr>
-          <p:cNvSpPr/>
-          <p:nvPr/>
-        </p:nvSpPr>
-        <p:spPr>
-          <a:xfrm>
-            <a:off x="3943904" y="3284737"/>
-            <a:ext cx="1868751" cy="754601"/>
-          </a:xfrm>
-          <a:prstGeom prst="wedgeRoundRectCallout">
-            <a:avLst>
-              <a:gd name="adj1" fmla="val -63213"/>
-              <a:gd name="adj2" fmla="val 119255"/>
-              <a:gd name="adj3" fmla="val 16667"/>
-            </a:avLst>
-          </a:prstGeom>
-        </p:spPr>
-        <p:style>
-          <a:lnRef idx="2">
-            <a:schemeClr val="accent1">
-              <a:shade val="50000"/>
-            </a:schemeClr>
-          </a:lnRef>
-          <a:fillRef idx="1">
-            <a:schemeClr val="accent1"/>
-          </a:fillRef>
-          <a:effectRef idx="0">
-            <a:schemeClr val="accent1"/>
-          </a:effectRef>
-          <a:fontRef idx="minor">
-            <a:schemeClr val="lt1"/>
-          </a:fontRef>
-        </p:style>
-        <p:txBody>
-          <a:bodyPr rtlCol="0" anchor="ctr"/>
-          <a:lstStyle/>
-          <a:p>
-            <a:pPr algn="ctr"/>
-            <a:r>
-              <a:rPr kumimoji="1" lang="en-US" altLang="ja-JP" dirty="0"/>
               <a:t>(</a:t>
             </a:r>
             <a:r>
@@ -5519,7 +5279,7 @@
         </p:nvSpPr>
         <p:spPr>
           <a:xfrm>
-            <a:off x="7764264" y="3284737"/>
+            <a:off x="6781038" y="3294569"/>
             <a:ext cx="1418206" cy="754601"/>
           </a:xfrm>
           <a:prstGeom prst="wedgeRoundRectCallout">
@@ -5580,6 +5340,156 @@
                 <a:srgbClr val="FFFF00"/>
               </a:solidFill>
             </a:endParaRPr>
+          </a:p>
+        </p:txBody>
+      </p:sp>
+      <p:sp>
+        <p:nvSpPr>
+          <p:cNvPr id="15" name="吹き出し: 角を丸めた四角形 14">
+            <a:extLst>
+              <a:ext uri="{FF2B5EF4-FFF2-40B4-BE49-F238E27FC236}">
+                <a16:creationId xmlns:a16="http://schemas.microsoft.com/office/drawing/2014/main" id="{E7A9C5F6-AE05-4DC4-9C96-DE7A9E10997D}"/>
+              </a:ext>
+            </a:extLst>
+          </p:cNvPr>
+          <p:cNvSpPr/>
+          <p:nvPr/>
+        </p:nvSpPr>
+        <p:spPr>
+          <a:xfrm>
+            <a:off x="3127038" y="5162697"/>
+            <a:ext cx="1868751" cy="754601"/>
+          </a:xfrm>
+          <a:prstGeom prst="wedgeRoundRectCallout">
+            <a:avLst>
+              <a:gd name="adj1" fmla="val -69526"/>
+              <a:gd name="adj2" fmla="val -356330"/>
+              <a:gd name="adj3" fmla="val 16667"/>
+            </a:avLst>
+          </a:prstGeom>
+        </p:spPr>
+        <p:style>
+          <a:lnRef idx="2">
+            <a:schemeClr val="accent1">
+              <a:shade val="50000"/>
+            </a:schemeClr>
+          </a:lnRef>
+          <a:fillRef idx="1">
+            <a:schemeClr val="accent1"/>
+          </a:fillRef>
+          <a:effectRef idx="0">
+            <a:schemeClr val="accent1"/>
+          </a:effectRef>
+          <a:fontRef idx="minor">
+            <a:schemeClr val="lt1"/>
+          </a:fontRef>
+        </p:style>
+        <p:txBody>
+          <a:bodyPr rtlCol="0" anchor="ctr"/>
+          <a:lstStyle/>
+          <a:p>
+            <a:pPr algn="ctr"/>
+            <a:r>
+              <a:rPr kumimoji="1" lang="en-US" altLang="ja-JP" dirty="0"/>
+              <a:t>(</a:t>
+            </a:r>
+            <a:r>
+              <a:rPr kumimoji="1" lang="ja-JP" altLang="en-US" dirty="0"/>
+              <a:t>数字の下半分</a:t>
+            </a:r>
+            <a:r>
+              <a:rPr kumimoji="1" lang="en-US" altLang="ja-JP" dirty="0"/>
+              <a:t>)</a:t>
+            </a:r>
+            <a:endParaRPr lang="en-US" altLang="ja-JP" dirty="0"/>
+          </a:p>
+          <a:p>
+            <a:pPr algn="ctr"/>
+            <a:r>
+              <a:rPr kumimoji="1" lang="ja-JP" altLang="en-US" b="1" dirty="0"/>
+              <a:t>ゼロ・</a:t>
+            </a:r>
+            <a:r>
+              <a:rPr kumimoji="1" lang="ja-JP" altLang="en-US" b="1" dirty="0">
+                <a:solidFill>
+                  <a:srgbClr val="FFFF00"/>
+                </a:solidFill>
+              </a:rPr>
+              <a:t>クリア</a:t>
+            </a:r>
+            <a:endParaRPr kumimoji="1" lang="en-US" altLang="ja-JP" b="1" dirty="0">
+              <a:solidFill>
+                <a:srgbClr val="FFFF00"/>
+              </a:solidFill>
+            </a:endParaRPr>
+          </a:p>
+        </p:txBody>
+      </p:sp>
+      <p:sp>
+        <p:nvSpPr>
+          <p:cNvPr id="16" name="吹き出し: 角を丸めた四角形 15">
+            <a:extLst>
+              <a:ext uri="{FF2B5EF4-FFF2-40B4-BE49-F238E27FC236}">
+                <a16:creationId xmlns:a16="http://schemas.microsoft.com/office/drawing/2014/main" id="{EFE8E637-A4C8-4EDF-9F02-4EDFB226905B}"/>
+              </a:ext>
+            </a:extLst>
+          </p:cNvPr>
+          <p:cNvSpPr/>
+          <p:nvPr/>
+        </p:nvSpPr>
+        <p:spPr>
+          <a:xfrm>
+            <a:off x="3127039" y="1446105"/>
+            <a:ext cx="1868751" cy="754601"/>
+          </a:xfrm>
+          <a:prstGeom prst="wedgeRoundRectCallout">
+            <a:avLst>
+              <a:gd name="adj1" fmla="val -88017"/>
+              <a:gd name="adj2" fmla="val 124125"/>
+              <a:gd name="adj3" fmla="val 16667"/>
+            </a:avLst>
+          </a:prstGeom>
+        </p:spPr>
+        <p:style>
+          <a:lnRef idx="2">
+            <a:schemeClr val="accent1">
+              <a:shade val="50000"/>
+            </a:schemeClr>
+          </a:lnRef>
+          <a:fillRef idx="1">
+            <a:schemeClr val="accent1"/>
+          </a:fillRef>
+          <a:effectRef idx="0">
+            <a:schemeClr val="accent1"/>
+          </a:effectRef>
+          <a:fontRef idx="minor">
+            <a:schemeClr val="lt1"/>
+          </a:fontRef>
+        </p:style>
+        <p:txBody>
+          <a:bodyPr rtlCol="0" anchor="ctr"/>
+          <a:lstStyle/>
+          <a:p>
+            <a:pPr algn="ctr"/>
+            <a:r>
+              <a:rPr kumimoji="1" lang="en-US" altLang="ja-JP" dirty="0"/>
+              <a:t>(</a:t>
+            </a:r>
+            <a:r>
+              <a:rPr kumimoji="1" lang="ja-JP" altLang="en-US" dirty="0"/>
+              <a:t>数字の上半分</a:t>
+            </a:r>
+            <a:r>
+              <a:rPr kumimoji="1" lang="en-US" altLang="ja-JP" dirty="0"/>
+              <a:t>)</a:t>
+            </a:r>
+          </a:p>
+          <a:p>
+            <a:pPr algn="ctr"/>
+            <a:r>
+              <a:rPr kumimoji="1" lang="ja-JP" altLang="en-US" b="1" dirty="0"/>
+              <a:t>カウントアップ</a:t>
+            </a:r>
           </a:p>
         </p:txBody>
       </p:sp>

</xml_diff>